<commit_message>
Challenge 0 first version
</commit_message>
<xml_diff>
--- a/Challenge 0/Challenge 0 - Khuat Bao Nguyen.pptx
+++ b/Challenge 0/Challenge 0 - Khuat Bao Nguyen.pptx
@@ -19,7 +19,6 @@
     <p:sldId id="267" r:id="rId23"/>
     <p:sldId id="268" r:id="rId24"/>
     <p:sldId id="269" r:id="rId25"/>
-    <p:sldId id="270" r:id="rId26"/>
   </p:sldIdLst>
   <p:sldSz cx="18288000" cy="10287000"/>
   <p:notesSz cx="6858000" cy="9144000"/>
@@ -3630,203 +3629,6 @@
           <a:chExt cx="0" cy="0"/>
         </a:xfrm>
       </p:grpSpPr>
-      <p:grpSp>
-        <p:nvGrpSpPr>
-          <p:cNvPr name="Group 2" id="2"/>
-          <p:cNvGrpSpPr/>
-          <p:nvPr/>
-        </p:nvGrpSpPr>
-        <p:grpSpPr>
-          <a:xfrm rot="0">
-            <a:off x="1185446" y="3308792"/>
-            <a:ext cx="16073854" cy="5949508"/>
-            <a:chOff x="0" y="0"/>
-            <a:chExt cx="2591637" cy="959258"/>
-          </a:xfrm>
-        </p:grpSpPr>
-        <p:sp>
-          <p:nvSpPr>
-            <p:cNvPr name="Freeform 3" id="3"/>
-            <p:cNvSpPr/>
-            <p:nvPr/>
-          </p:nvSpPr>
-          <p:spPr>
-            <a:xfrm flipH="false" flipV="false" rot="0">
-              <a:off x="0" y="0"/>
-              <a:ext cx="2591637" cy="959258"/>
-            </a:xfrm>
-            <a:custGeom>
-              <a:avLst/>
-              <a:gdLst/>
-              <a:ahLst/>
-              <a:cxnLst/>
-              <a:rect r="r" b="b" t="t" l="l"/>
-              <a:pathLst>
-                <a:path h="959258" w="2591637">
-                  <a:moveTo>
-                    <a:pt x="0" y="0"/>
-                  </a:moveTo>
-                  <a:lnTo>
-                    <a:pt x="2591637" y="0"/>
-                  </a:lnTo>
-                  <a:lnTo>
-                    <a:pt x="2591637" y="959258"/>
-                  </a:lnTo>
-                  <a:lnTo>
-                    <a:pt x="0" y="959258"/>
-                  </a:lnTo>
-                  <a:close/>
-                </a:path>
-              </a:pathLst>
-            </a:custGeom>
-            <a:blipFill>
-              <a:blip r:embed="rId2"/>
-              <a:stretch>
-                <a:fillRect l="-5472" t="0" r="-5472" b="0"/>
-              </a:stretch>
-            </a:blipFill>
-            <a:ln w="38100" cap="sq">
-              <a:solidFill>
-                <a:srgbClr val="000000"/>
-              </a:solidFill>
-              <a:prstDash val="solid"/>
-              <a:miter/>
-            </a:ln>
-          </p:spPr>
-        </p:sp>
-      </p:grpSp>
-      <p:sp>
-        <p:nvSpPr>
-          <p:cNvPr name="Freeform 4" id="4"/>
-          <p:cNvSpPr/>
-          <p:nvPr/>
-        </p:nvSpPr>
-        <p:spPr>
-          <a:xfrm flipH="false" flipV="false" rot="-1625759">
-            <a:off x="10837013" y="-4312634"/>
-            <a:ext cx="9495369" cy="7717145"/>
-          </a:xfrm>
-          <a:custGeom>
-            <a:avLst/>
-            <a:gdLst/>
-            <a:ahLst/>
-            <a:cxnLst/>
-            <a:rect r="r" b="b" t="t" l="l"/>
-            <a:pathLst>
-              <a:path h="7717145" w="9495369">
-                <a:moveTo>
-                  <a:pt x="0" y="0"/>
-                </a:moveTo>
-                <a:lnTo>
-                  <a:pt x="9495369" y="0"/>
-                </a:lnTo>
-                <a:lnTo>
-                  <a:pt x="9495369" y="7717145"/>
-                </a:lnTo>
-                <a:lnTo>
-                  <a:pt x="0" y="7717145"/>
-                </a:lnTo>
-                <a:lnTo>
-                  <a:pt x="0" y="0"/>
-                </a:lnTo>
-                <a:close/>
-              </a:path>
-            </a:pathLst>
-          </a:custGeom>
-          <a:blipFill>
-            <a:blip r:embed="rId3">
-              <a:alphaModFix amt="50000"/>
-              <a:extLst>
-                <a:ext uri="{96DAC541-7B7A-43D3-8B79-37D633B846F1}">
-                  <asvg:svgBlip xmlns:asvg="http://schemas.microsoft.com/office/drawing/2016/SVG/main" r:embed="rId4"/>
-                </a:ext>
-              </a:extLst>
-            </a:blip>
-            <a:stretch>
-              <a:fillRect l="0" t="0" r="0" b="0"/>
-            </a:stretch>
-          </a:blipFill>
-        </p:spPr>
-      </p:sp>
-      <p:sp>
-        <p:nvSpPr>
-          <p:cNvPr name="TextBox 5" id="5"/>
-          <p:cNvSpPr txBox="true"/>
-          <p:nvPr/>
-        </p:nvSpPr>
-        <p:spPr>
-          <a:xfrm rot="0">
-            <a:off x="1185446" y="770992"/>
-            <a:ext cx="11953237" cy="1814830"/>
-          </a:xfrm>
-          <a:prstGeom prst="rect">
-            <a:avLst/>
-          </a:prstGeom>
-        </p:spPr>
-        <p:txBody>
-          <a:bodyPr anchor="t" rtlCol="false" tIns="0" lIns="0" bIns="0" rIns="0">
-            <a:spAutoFit/>
-          </a:bodyPr>
-          <a:lstStyle/>
-          <a:p>
-            <a:pPr>
-              <a:lnSpc>
-                <a:spcPts val="7085"/>
-              </a:lnSpc>
-            </a:pPr>
-            <a:r>
-              <a:rPr lang="en-US" sz="6500">
-                <a:solidFill>
-                  <a:srgbClr val="004AAD"/>
-                </a:solidFill>
-                <a:latin typeface="Montserrat Classic Bold"/>
-              </a:rPr>
-              <a:t>WHY AUTONOMY </a:t>
-            </a:r>
-          </a:p>
-          <a:p>
-            <a:pPr>
-              <a:lnSpc>
-                <a:spcPts val="7085"/>
-              </a:lnSpc>
-            </a:pPr>
-            <a:r>
-              <a:rPr lang="en-US" sz="6500">
-                <a:solidFill>
-                  <a:srgbClr val="004AAD"/>
-                </a:solidFill>
-                <a:latin typeface="Montserrat Classic Bold"/>
-              </a:rPr>
-              <a:t>AT WORK IS IMPORTANT</a:t>
-            </a:r>
-          </a:p>
-        </p:txBody>
-      </p:sp>
-    </p:spTree>
-  </p:cSld>
-  <p:clrMapOvr>
-    <a:masterClrMapping/>
-  </p:clrMapOvr>
-</p:sld>
-</file>
-
-<file path=ppt/slides/slide12.xml><?xml version="1.0" encoding="utf-8"?>
-<p:sld xmlns:p="http://schemas.openxmlformats.org/presentationml/2006/main" xmlns:a="http://schemas.openxmlformats.org/drawingml/2006/main" xmlns:r="http://schemas.openxmlformats.org/officeDocument/2006/relationships">
-  <p:cSld>
-    <p:spTree>
-      <p:nvGrpSpPr>
-        <p:cNvPr id="1" name=""/>
-        <p:cNvGrpSpPr/>
-        <p:nvPr/>
-      </p:nvGrpSpPr>
-      <p:grpSpPr>
-        <a:xfrm>
-          <a:off x="0" y="0"/>
-          <a:ext cx="0" cy="0"/>
-          <a:chOff x="0" y="0"/>
-          <a:chExt cx="0" cy="0"/>
-        </a:xfrm>
-      </p:grpSpPr>
       <p:sp>
         <p:nvSpPr>
           <p:cNvPr name="Freeform 2" id="2"/>
@@ -4251,7 +4053,7 @@
 </p:sld>
 </file>
 
-<file path=ppt/slides/slide13.xml><?xml version="1.0" encoding="utf-8"?>
+<file path=ppt/slides/slide12.xml><?xml version="1.0" encoding="utf-8"?>
 <p:sld xmlns:p="http://schemas.openxmlformats.org/presentationml/2006/main" xmlns:a="http://schemas.openxmlformats.org/drawingml/2006/main" xmlns:r="http://schemas.openxmlformats.org/officeDocument/2006/relationships">
   <p:cSld>
     <p:spTree>
@@ -4432,7 +4234,7 @@
 </p:sld>
 </file>
 
-<file path=ppt/slides/slide14.xml><?xml version="1.0" encoding="utf-8"?>
+<file path=ppt/slides/slide13.xml><?xml version="1.0" encoding="utf-8"?>
 <p:sld xmlns:p="http://schemas.openxmlformats.org/presentationml/2006/main" xmlns:a="http://schemas.openxmlformats.org/drawingml/2006/main" xmlns:r="http://schemas.openxmlformats.org/officeDocument/2006/relationships">
   <p:cSld>
     <p:spTree>
@@ -4613,7 +4415,7 @@
 </p:sld>
 </file>
 
-<file path=ppt/slides/slide15.xml><?xml version="1.0" encoding="utf-8"?>
+<file path=ppt/slides/slide14.xml><?xml version="1.0" encoding="utf-8"?>
 <p:sld xmlns:p="http://schemas.openxmlformats.org/presentationml/2006/main" xmlns:a="http://schemas.openxmlformats.org/drawingml/2006/main" xmlns:r="http://schemas.openxmlformats.org/officeDocument/2006/relationships">
   <p:cSld>
     <p:spTree>

</xml_diff>